<commit_message>
Set up Firebase initialization and added a simple UI to confirm connection
</commit_message>
<xml_diff>
--- a/Productivity App UI.pptx
+++ b/Productivity App UI.pptx
@@ -17198,8 +17198,8 @@
         </p:nvSpPr>
         <p:spPr>
           <a:xfrm>
-            <a:off x="8369559" y="2485213"/>
-            <a:ext cx="3060441" cy="2167491"/>
+            <a:off x="7828383" y="2345254"/>
+            <a:ext cx="4068147" cy="2167491"/>
           </a:xfrm>
         </p:spPr>
         <p:txBody>
@@ -17207,10 +17207,9 @@
           <a:lstStyle/>
           <a:p>
             <a:r>
-              <a:rPr lang="en-US" dirty="0" err="1"/>
-              <a:t>ZenDo</a:t>
+              <a:rPr lang="en-US" dirty="0"/>
+              <a:t>Productivity App</a:t>
             </a:r>
-            <a:endParaRPr lang="en-US" dirty="0"/>
           </a:p>
         </p:txBody>
       </p:sp>
@@ -18506,6 +18505,15 @@
 </file>
 
 <file path=customXml/item1.xml><?xml version="1.0" encoding="utf-8"?>
+<?mso-contentType ?>
+<FormTemplates xmlns="http://schemas.microsoft.com/sharepoint/v3/contenttype/forms">
+  <Display>DocumentLibraryForm</Display>
+  <Edit>DocumentLibraryForm</Edit>
+  <New>DocumentLibraryForm</New>
+</FormTemplates>
+</file>
+
+<file path=customXml/item2.xml><?xml version="1.0" encoding="utf-8"?>
 <p:properties xmlns:p="http://schemas.microsoft.com/office/2006/metadata/properties" xmlns:xsi="http://www.w3.org/2001/XMLSchema-instance" xmlns:pc="http://schemas.microsoft.com/office/infopath/2007/PartnerControls">
   <documentManagement>
     <_ip_UnifiedCompliancePolicyUIAction xmlns="http://schemas.microsoft.com/sharepoint/v3" xsi:nil="true"/>
@@ -18523,15 +18531,6 @@
     <MediaServiceKeyPoints xmlns="71af3243-3dd4-4a8d-8c0d-dd76da1f02a5" xsi:nil="true"/>
   </documentManagement>
 </p:properties>
-</file>
-
-<file path=customXml/item2.xml><?xml version="1.0" encoding="utf-8"?>
-<?mso-contentType ?>
-<FormTemplates xmlns="http://schemas.microsoft.com/sharepoint/v3/contenttype/forms">
-  <Display>DocumentLibraryForm</Display>
-  <Edit>DocumentLibraryForm</Edit>
-  <New>DocumentLibraryForm</New>
-</FormTemplates>
 </file>
 
 <file path=customXml/item3.xml><?xml version="1.0" encoding="utf-8"?>
@@ -18847,6 +18846,14 @@
 </file>
 
 <file path=customXml/itemProps1.xml><?xml version="1.0" encoding="utf-8"?>
+<ds:datastoreItem xmlns:ds="http://schemas.openxmlformats.org/officeDocument/2006/customXml" ds:itemID="{16DBB56F-4362-4386-A1A1-3DF898896616}">
+  <ds:schemaRefs>
+    <ds:schemaRef ds:uri="http://schemas.microsoft.com/sharepoint/v3/contenttype/forms"/>
+  </ds:schemaRefs>
+</ds:datastoreItem>
+</file>
+
+<file path=customXml/itemProps2.xml><?xml version="1.0" encoding="utf-8"?>
 <ds:datastoreItem xmlns:ds="http://schemas.openxmlformats.org/officeDocument/2006/customXml" ds:itemID="{BA719FA4-954C-4FA8-82CB-206659C3B826}">
   <ds:schemaRefs>
     <ds:schemaRef ds:uri="http://schemas.microsoft.com/office/2006/metadata/properties"/>
@@ -18854,14 +18861,6 @@
     <ds:schemaRef ds:uri="http://schemas.microsoft.com/sharepoint/v3"/>
     <ds:schemaRef ds:uri="71af3243-3dd4-4a8d-8c0d-dd76da1f02a5"/>
     <ds:schemaRef ds:uri="230e9df3-be65-4c73-a93b-d1236ebd677e"/>
-  </ds:schemaRefs>
-</ds:datastoreItem>
-</file>
-
-<file path=customXml/itemProps2.xml><?xml version="1.0" encoding="utf-8"?>
-<ds:datastoreItem xmlns:ds="http://schemas.openxmlformats.org/officeDocument/2006/customXml" ds:itemID="{16DBB56F-4362-4386-A1A1-3DF898896616}">
-  <ds:schemaRefs>
-    <ds:schemaRef ds:uri="http://schemas.microsoft.com/sharepoint/v3/contenttype/forms"/>
   </ds:schemaRefs>
 </ds:datastoreItem>
 </file>

</xml_diff>